<commit_message>
Update of dates in the slides
</commit_message>
<xml_diff>
--- a/2023/hercules2023_A_intro.pptx
+++ b/2023/hercules2023_A_intro.pptx
@@ -249,7 +249,7 @@
             <a:fld id="{D680E798-53FF-4C51-A981-953463752515}" type="datetimeFigureOut">
               <a:rPr lang="fr-FR" smtClean="0"/>
               <a:pPr/>
-              <a:t>10/03/2022</a:t>
+              <a:t>24/03/2023</a:t>
             </a:fld>
             <a:endParaRPr lang="fr-FR"/>
           </a:p>
@@ -769,7 +769,7 @@
           <a:p>
             <a:r>
               <a:rPr lang="en-US" noProof="0" smtClean="0"/>
-              <a:t>OASYS-Intro | HERCULES2022</a:t>
+              <a:t>OASYS-Intro | HERCULES2023</a:t>
             </a:r>
             <a:endParaRPr lang="en-US" noProof="0" dirty="0"/>
           </a:p>
@@ -1100,7 +1100,7 @@
           <a:p>
             <a:r>
               <a:rPr lang="en-US" noProof="0" smtClean="0"/>
-              <a:t>OASYS-Intro | HERCULES2022</a:t>
+              <a:t>OASYS-Intro | HERCULES2023</a:t>
             </a:r>
             <a:endParaRPr lang="en-US" noProof="0"/>
           </a:p>
@@ -1290,7 +1290,7 @@
           <a:p>
             <a:r>
               <a:rPr lang="en-US" noProof="0" smtClean="0"/>
-              <a:t>OASYS-Intro | HERCULES2022</a:t>
+              <a:t>OASYS-Intro | HERCULES2023</a:t>
             </a:r>
             <a:endParaRPr lang="en-US" noProof="0"/>
           </a:p>
@@ -1412,7 +1412,7 @@
           <a:p>
             <a:r>
               <a:rPr lang="en-US" noProof="0" smtClean="0"/>
-              <a:t>OASYS-Intro | HERCULES2022</a:t>
+              <a:t>OASYS-Intro | HERCULES2023</a:t>
             </a:r>
             <a:endParaRPr lang="en-US" noProof="0"/>
           </a:p>
@@ -1646,7 +1646,7 @@
           <a:p>
             <a:r>
               <a:rPr lang="en-US" smtClean="0"/>
-              <a:t>OASYS-Intro | HERCULES2022</a:t>
+              <a:t>OASYS-Intro | HERCULES2023</a:t>
             </a:r>
             <a:endParaRPr lang="fr-FR" dirty="0"/>
           </a:p>
@@ -2120,8 +2120,8 @@
           <a:lstStyle/>
           <a:p>
             <a:r>
-              <a:rPr lang="en-US" dirty="0" smtClean="0"/>
-              <a:t>Introduction to OASYS ASD/IDM Meeting | J. Reyes-Herrera</a:t>
+              <a:rPr lang="en-US" smtClean="0"/>
+              <a:t>OASYS-Intro | HERCULES2023</a:t>
             </a:r>
             <a:endParaRPr lang="fr-FR" dirty="0"/>
           </a:p>
@@ -3254,7 +3254,7 @@
           <a:p>
             <a:r>
               <a:rPr lang="en-US" noProof="0" smtClean="0"/>
-              <a:t>OASYS-Intro | HERCULES2022</a:t>
+              <a:t>OASYS-Intro | HERCULES2023</a:t>
             </a:r>
             <a:endParaRPr lang="en-US" noProof="0"/>
           </a:p>
@@ -3650,7 +3650,7 @@
           <a:p>
             <a:r>
               <a:rPr lang="en-US" noProof="0" smtClean="0"/>
-              <a:t>OASYS-Intro | HERCULES2022</a:t>
+              <a:t>OASYS-Intro | HERCULES2023</a:t>
             </a:r>
             <a:endParaRPr lang="en-US" noProof="0"/>
           </a:p>
@@ -5290,7 +5290,7 @@
           <a:p>
             <a:r>
               <a:rPr lang="en-US" noProof="0" smtClean="0"/>
-              <a:t>OASYS-Intro | HERCULES2022</a:t>
+              <a:t>OASYS-Intro | HERCULES2023</a:t>
             </a:r>
             <a:endParaRPr lang="en-US" noProof="0"/>
           </a:p>
@@ -5630,7 +5630,7 @@
           <a:p>
             <a:r>
               <a:rPr lang="en-US" noProof="0" smtClean="0"/>
-              <a:t>OASYS-Intro | HERCULES2022</a:t>
+              <a:t>OASYS-Intro | HERCULES2023</a:t>
             </a:r>
             <a:endParaRPr lang="en-US" noProof="0"/>
           </a:p>
@@ -6108,7 +6108,7 @@
           <a:p>
             <a:r>
               <a:rPr lang="en-US" noProof="0" smtClean="0"/>
-              <a:t>OASYS-Intro | HERCULES2022</a:t>
+              <a:t>OASYS-Intro | HERCULES2023</a:t>
             </a:r>
             <a:endParaRPr lang="en-US" noProof="0"/>
           </a:p>
@@ -6310,7 +6310,7 @@
           <a:p>
             <a:r>
               <a:rPr lang="en-US" noProof="0" smtClean="0"/>
-              <a:t>OASYS-Intro | HERCULES2022</a:t>
+              <a:t>OASYS-Intro | HERCULES2023</a:t>
             </a:r>
             <a:endParaRPr lang="en-US" noProof="0"/>
           </a:p>
@@ -6423,21 +6423,8 @@
                   <a:srgbClr val="00B050"/>
                 </a:solidFill>
               </a:rPr>
-              <a:t>Understand basic principles of X-ray optics: </a:t>
-            </a:r>
-            <a:r>
-              <a:rPr lang="en-US" dirty="0" smtClean="0">
-                <a:solidFill>
-                  <a:srgbClr val="00B050"/>
-                </a:solidFill>
-              </a:rPr>
-              <a:t>Mirrors and Crystals.</a:t>
-            </a:r>
-            <a:endParaRPr lang="en-US" dirty="0" smtClean="0">
-              <a:solidFill>
-                <a:srgbClr val="00B050"/>
-              </a:solidFill>
-            </a:endParaRPr>
+              <a:t>Understand basic principles of X-ray optics: Mirrors and Crystals.</a:t>
+            </a:r>
           </a:p>
           <a:p>
             <a:pPr marL="285750" indent="-285750">
@@ -6645,7 +6632,11 @@
             <a:pPr algn="ctr"/>
             <a:r>
               <a:rPr lang="en-US" sz="1167" dirty="0" smtClean="0"/>
-              <a:t>March 15</a:t>
+              <a:t>March </a:t>
+            </a:r>
+            <a:r>
+              <a:rPr lang="en-US" sz="1167" dirty="0" smtClean="0"/>
+              <a:t>27</a:t>
             </a:r>
             <a:r>
               <a:rPr lang="en-US" sz="1167" baseline="30000" dirty="0" smtClean="0"/>
@@ -6653,19 +6644,23 @@
             </a:r>
             <a:r>
               <a:rPr lang="en-US" sz="1167" dirty="0" smtClean="0"/>
-              <a:t> &amp; 17</a:t>
+              <a:t> </a:t>
+            </a:r>
+            <a:r>
+              <a:rPr lang="en-US" sz="1167" dirty="0" smtClean="0"/>
+              <a:t>&amp; </a:t>
+            </a:r>
+            <a:r>
+              <a:rPr lang="en-US" sz="1167" dirty="0" smtClean="0"/>
+              <a:t>30</a:t>
             </a:r>
             <a:r>
               <a:rPr lang="en-US" sz="1167" baseline="30000" dirty="0" smtClean="0"/>
               <a:t>th</a:t>
             </a:r>
             <a:r>
-              <a:rPr lang="en-US" sz="1167" dirty="0"/>
-              <a:t> </a:t>
-            </a:r>
-            <a:r>
               <a:rPr lang="en-US" sz="1167" dirty="0" smtClean="0"/>
-              <a:t>2022</a:t>
+              <a:t> 2023</a:t>
             </a:r>
             <a:endParaRPr lang="en-US" sz="1167" dirty="0"/>
           </a:p>
@@ -6724,7 +6719,7 @@
           <a:p>
             <a:r>
               <a:rPr lang="en-GB" sz="833" smtClean="0"/>
-              <a:t>OASYS-Intro | HERCULES2022</a:t>
+              <a:t>OASYS-Intro | HERCULES2023</a:t>
             </a:r>
             <a:endParaRPr lang="fr-FR" sz="833" dirty="0"/>
           </a:p>
@@ -6924,7 +6919,7 @@
           <a:p>
             <a:r>
               <a:rPr lang="en-US" noProof="0" smtClean="0"/>
-              <a:t>OASYS-Intro | HERCULES2022</a:t>
+              <a:t>OASYS-Intro | HERCULES2023</a:t>
             </a:r>
             <a:endParaRPr lang="en-US" noProof="0"/>
           </a:p>
@@ -7155,7 +7150,7 @@
           <a:p>
             <a:r>
               <a:rPr lang="en-US" noProof="0" smtClean="0"/>
-              <a:t>OASYS-Intro | HERCULES2022</a:t>
+              <a:t>OASYS-Intro | HERCULES2023</a:t>
             </a:r>
             <a:endParaRPr lang="en-US" noProof="0"/>
           </a:p>
@@ -7413,7 +7408,7 @@
           <a:p>
             <a:r>
               <a:rPr lang="en-US" noProof="0" smtClean="0"/>
-              <a:t>OASYS-Intro | HERCULES2022</a:t>
+              <a:t>OASYS-Intro | HERCULES2023</a:t>
             </a:r>
             <a:endParaRPr lang="en-US" noProof="0"/>
           </a:p>
@@ -9050,7 +9045,7 @@
           <a:p>
             <a:r>
               <a:rPr lang="en-US" noProof="0" smtClean="0"/>
-              <a:t>OASYS-Intro | HERCULES2022</a:t>
+              <a:t>OASYS-Intro | HERCULES2023</a:t>
             </a:r>
             <a:endParaRPr lang="en-US" noProof="0"/>
           </a:p>
@@ -9861,7 +9856,7 @@
           <a:p>
             <a:r>
               <a:rPr lang="en-US" noProof="0" smtClean="0"/>
-              <a:t>OASYS-Intro | HERCULES2022</a:t>
+              <a:t>OASYS-Intro | HERCULES2023</a:t>
             </a:r>
             <a:endParaRPr lang="en-US" noProof="0"/>
           </a:p>
@@ -10357,7 +10352,7 @@
           <a:p>
             <a:r>
               <a:rPr lang="en-US" noProof="0" smtClean="0"/>
-              <a:t>OASYS-Intro | HERCULES2022</a:t>
+              <a:t>OASYS-Intro | HERCULES2023</a:t>
             </a:r>
             <a:endParaRPr lang="en-US" noProof="0"/>
           </a:p>
@@ -11006,7 +11001,7 @@
           <a:p>
             <a:r>
               <a:rPr lang="en-US" noProof="0" smtClean="0"/>
-              <a:t>OASYS-Intro | HERCULES2022</a:t>
+              <a:t>OASYS-Intro | HERCULES2023</a:t>
             </a:r>
             <a:endParaRPr lang="en-US" noProof="0"/>
           </a:p>

</xml_diff>